<commit_message>
Added TAH icon to presentation
</commit_message>
<xml_diff>
--- a/EventDrivenArchitectureWorkshop.pptx
+++ b/EventDrivenArchitectureWorkshop.pptx
@@ -139,6 +139,11 @@
       </a:defRPr>
     </a:lvl9pPr>
   </p:defaultTextStyle>
+  <p:extLst>
+    <p:ext uri="{EFAFB233-063F-42B5-8137-9DF3F51BA10A}">
+      <p15:sldGuideLst xmlns:p15="http://schemas.microsoft.com/office/powerpoint/2012/main"/>
+    </p:ext>
+  </p:extLst>
 </p:presentation>
 </file>
 
@@ -3202,10 +3207,39 @@
               <a:rPr lang="en-US" dirty="0" smtClean="0"/>
               <a:t>System has to be taken down during deployments and deployments occasionally fail because of uncoordinated changes across development teams</a:t>
             </a:r>
-            <a:endParaRPr lang="en-US" dirty="0" smtClean="0"/>
-          </a:p>
-        </p:txBody>
-      </p:sp>
+          </a:p>
+        </p:txBody>
+      </p:sp>
+      <p:pic>
+        <p:nvPicPr>
+          <p:cNvPr id="4" name="Picture 3"/>
+          <p:cNvPicPr>
+            <a:picLocks noChangeAspect="1"/>
+          </p:cNvPicPr>
+          <p:nvPr/>
+        </p:nvPicPr>
+        <p:blipFill>
+          <a:blip r:embed="rId2" cstate="print">
+            <a:extLst>
+              <a:ext uri="{28A0092B-C50C-407E-A947-70E740481C1C}">
+                <a14:useLocalDpi xmlns:a14="http://schemas.microsoft.com/office/drawing/2010/main" val="0"/>
+              </a:ext>
+            </a:extLst>
+          </a:blip>
+          <a:stretch>
+            <a:fillRect/>
+          </a:stretch>
+        </p:blipFill>
+        <p:spPr>
+          <a:xfrm>
+            <a:off x="9135291" y="292047"/>
+            <a:ext cx="2455817" cy="1381224"/>
+          </a:xfrm>
+          <a:prstGeom prst="rect">
+            <a:avLst/>
+          </a:prstGeom>
+        </p:spPr>
+      </p:pic>
     </p:spTree>
     <p:extLst>
       <p:ext uri="{BB962C8B-B14F-4D97-AF65-F5344CB8AC3E}">
@@ -3338,10 +3372,39 @@
               <a:rPr lang="en-US" dirty="0" smtClean="0"/>
               <a:t>Decouple components and teams</a:t>
             </a:r>
-            <a:endParaRPr lang="en-US" dirty="0" smtClean="0"/>
-          </a:p>
-        </p:txBody>
-      </p:sp>
+          </a:p>
+        </p:txBody>
+      </p:sp>
+      <p:pic>
+        <p:nvPicPr>
+          <p:cNvPr id="4" name="Picture 3"/>
+          <p:cNvPicPr>
+            <a:picLocks noChangeAspect="1"/>
+          </p:cNvPicPr>
+          <p:nvPr/>
+        </p:nvPicPr>
+        <p:blipFill>
+          <a:blip r:embed="rId2" cstate="print">
+            <a:extLst>
+              <a:ext uri="{28A0092B-C50C-407E-A947-70E740481C1C}">
+                <a14:useLocalDpi xmlns:a14="http://schemas.microsoft.com/office/drawing/2010/main" val="0"/>
+              </a:ext>
+            </a:extLst>
+          </a:blip>
+          <a:stretch>
+            <a:fillRect/>
+          </a:stretch>
+        </p:blipFill>
+        <p:spPr>
+          <a:xfrm>
+            <a:off x="9135291" y="292047"/>
+            <a:ext cx="2455817" cy="1381224"/>
+          </a:xfrm>
+          <a:prstGeom prst="rect">
+            <a:avLst/>
+          </a:prstGeom>
+        </p:spPr>
+      </p:pic>
     </p:spTree>
     <p:extLst>
       <p:ext uri="{BB962C8B-B14F-4D97-AF65-F5344CB8AC3E}">
@@ -3487,10 +3550,39 @@
               <a:rPr lang="en-US" b="1" i="1" dirty="0" smtClean="0"/>
               <a:t>materialized views</a:t>
             </a:r>
-            <a:endParaRPr lang="en-US" b="1" i="1" dirty="0" smtClean="0"/>
-          </a:p>
-        </p:txBody>
-      </p:sp>
+          </a:p>
+        </p:txBody>
+      </p:sp>
+      <p:pic>
+        <p:nvPicPr>
+          <p:cNvPr id="4" name="Picture 3"/>
+          <p:cNvPicPr>
+            <a:picLocks noChangeAspect="1"/>
+          </p:cNvPicPr>
+          <p:nvPr/>
+        </p:nvPicPr>
+        <p:blipFill>
+          <a:blip r:embed="rId2" cstate="print">
+            <a:extLst>
+              <a:ext uri="{28A0092B-C50C-407E-A947-70E740481C1C}">
+                <a14:useLocalDpi xmlns:a14="http://schemas.microsoft.com/office/drawing/2010/main" val="0"/>
+              </a:ext>
+            </a:extLst>
+          </a:blip>
+          <a:stretch>
+            <a:fillRect/>
+          </a:stretch>
+        </p:blipFill>
+        <p:spPr>
+          <a:xfrm>
+            <a:off x="9135291" y="292047"/>
+            <a:ext cx="2455817" cy="1381224"/>
+          </a:xfrm>
+          <a:prstGeom prst="rect">
+            <a:avLst/>
+          </a:prstGeom>
+        </p:spPr>
+      </p:pic>
     </p:spTree>
     <p:extLst>
       <p:ext uri="{BB962C8B-B14F-4D97-AF65-F5344CB8AC3E}">
@@ -3877,11 +3969,7 @@
             <a:pPr algn="ctr"/>
             <a:r>
               <a:rPr lang="en-US" dirty="0" smtClean="0"/>
-              <a:t>Auto </a:t>
-            </a:r>
-            <a:r>
-              <a:rPr lang="en-US" dirty="0" smtClean="0"/>
-              <a:t>Approval</a:t>
+              <a:t>Auto Approval</a:t>
             </a:r>
           </a:p>
           <a:p>
@@ -4941,6 +5029,36 @@
           </a:p>
         </p:txBody>
       </p:sp>
+      <p:pic>
+        <p:nvPicPr>
+          <p:cNvPr id="36" name="Picture 35"/>
+          <p:cNvPicPr>
+            <a:picLocks noChangeAspect="1"/>
+          </p:cNvPicPr>
+          <p:nvPr/>
+        </p:nvPicPr>
+        <p:blipFill>
+          <a:blip r:embed="rId2" cstate="print">
+            <a:extLst>
+              <a:ext uri="{28A0092B-C50C-407E-A947-70E740481C1C}">
+                <a14:useLocalDpi xmlns:a14="http://schemas.microsoft.com/office/drawing/2010/main" val="0"/>
+              </a:ext>
+            </a:extLst>
+          </a:blip>
+          <a:stretch>
+            <a:fillRect/>
+          </a:stretch>
+        </p:blipFill>
+        <p:spPr>
+          <a:xfrm>
+            <a:off x="9135291" y="292047"/>
+            <a:ext cx="2455817" cy="1381224"/>
+          </a:xfrm>
+          <a:prstGeom prst="rect">
+            <a:avLst/>
+          </a:prstGeom>
+        </p:spPr>
+      </p:pic>
     </p:spTree>
     <p:extLst>
       <p:ext uri="{BB962C8B-B14F-4D97-AF65-F5344CB8AC3E}">
@@ -5128,7 +5246,6 @@
               <a:rPr lang="en-US" b="1" i="1" dirty="0" smtClean="0"/>
               <a:t>event stream</a:t>
             </a:r>
-            <a:endParaRPr lang="en-US" b="1" i="1" dirty="0" smtClean="0"/>
           </a:p>
         </p:txBody>
       </p:sp>
@@ -5447,7 +5564,7 @@
         <p:spPr/>
         <p:txBody>
           <a:bodyPr>
-            <a:normAutofit fontScale="77500" lnSpcReduction="20000"/>
+            <a:normAutofit fontScale="85000" lnSpcReduction="20000"/>
           </a:bodyPr>
           <a:lstStyle/>
           <a:p>
@@ -5733,7 +5850,6 @@
               <a:rPr lang="en-US" dirty="0" smtClean="0"/>
               <a:t>Key terms</a:t>
             </a:r>
-            <a:endParaRPr lang="en-US" dirty="0" smtClean="0"/>
           </a:p>
         </p:txBody>
       </p:sp>
@@ -5966,7 +6082,6 @@
               <a:rPr lang="en-US" dirty="0" smtClean="0"/>
               <a:t>Create Shared Access Policy for publisher</a:t>
             </a:r>
-            <a:endParaRPr lang="en-US" dirty="0" smtClean="0"/>
           </a:p>
         </p:txBody>
       </p:sp>
@@ -6271,7 +6386,6 @@
               <a:rPr lang="en-US" dirty="0" smtClean="0"/>
               <a:t>Later exercises will demonstrate asynchronous messaging and scalability</a:t>
             </a:r>
-            <a:endParaRPr lang="en-US" dirty="0" smtClean="0"/>
           </a:p>
         </p:txBody>
       </p:sp>
@@ -7455,7 +7569,6 @@
               <a:rPr lang="en-US" dirty="0" smtClean="0"/>
               <a:t> ??? Application and deployed as ???</a:t>
             </a:r>
-            <a:endParaRPr lang="en-US" dirty="0" smtClean="0"/>
           </a:p>
         </p:txBody>
       </p:sp>
@@ -8210,7 +8323,6 @@
               <a:rPr lang="en-US" dirty="0" smtClean="0"/>
               <a:t>Request router subscribes to document topic, updates request, and sends update to UI</a:t>
             </a:r>
-            <a:endParaRPr lang="en-US" dirty="0" smtClean="0"/>
           </a:p>
         </p:txBody>
       </p:sp>
@@ -8450,7 +8562,6 @@
               <a:rPr lang="en-US" dirty="0" smtClean="0"/>
               <a:t>??? Should be something that just consumes existing event/s</a:t>
             </a:r>
-            <a:endParaRPr lang="en-US" dirty="0" smtClean="0"/>
           </a:p>
         </p:txBody>
       </p:sp>
@@ -8717,7 +8828,6 @@
               <a:rPr lang="en-US" dirty="0" smtClean="0"/>
               <a:t>Delete resources</a:t>
             </a:r>
-            <a:endParaRPr lang="en-US" dirty="0" smtClean="0"/>
           </a:p>
         </p:txBody>
       </p:sp>
@@ -9173,6 +9283,36 @@
           </a:p>
         </p:txBody>
       </p:sp>
+      <p:pic>
+        <p:nvPicPr>
+          <p:cNvPr id="2" name="Picture 1"/>
+          <p:cNvPicPr>
+            <a:picLocks noChangeAspect="1"/>
+          </p:cNvPicPr>
+          <p:nvPr/>
+        </p:nvPicPr>
+        <p:blipFill>
+          <a:blip r:embed="rId2" cstate="print">
+            <a:extLst>
+              <a:ext uri="{28A0092B-C50C-407E-A947-70E740481C1C}">
+                <a14:useLocalDpi xmlns:a14="http://schemas.microsoft.com/office/drawing/2010/main" val="0"/>
+              </a:ext>
+            </a:extLst>
+          </a:blip>
+          <a:stretch>
+            <a:fillRect/>
+          </a:stretch>
+        </p:blipFill>
+        <p:spPr>
+          <a:xfrm>
+            <a:off x="9135291" y="292047"/>
+            <a:ext cx="2455817" cy="1381224"/>
+          </a:xfrm>
+          <a:prstGeom prst="rect">
+            <a:avLst/>
+          </a:prstGeom>
+        </p:spPr>
+      </p:pic>
     </p:spTree>
     <p:extLst>
       <p:ext uri="{BB962C8B-B14F-4D97-AF65-F5344CB8AC3E}">
@@ -9506,11 +9646,7 @@
             <a:pPr algn="ctr"/>
             <a:r>
               <a:rPr lang="en-US" dirty="0" smtClean="0"/>
-              <a:t>Auto </a:t>
-            </a:r>
-            <a:r>
-              <a:rPr lang="en-US" dirty="0" smtClean="0"/>
-              <a:t>Approval Service</a:t>
+              <a:t>Auto Approval Service</a:t>
             </a:r>
             <a:endParaRPr lang="en-US" dirty="0"/>
           </a:p>
@@ -9554,11 +9690,7 @@
             <a:pPr algn="ctr"/>
             <a:r>
               <a:rPr lang="en-US" dirty="0" smtClean="0"/>
-              <a:t>Routing </a:t>
-            </a:r>
-            <a:r>
-              <a:rPr lang="en-US" dirty="0" smtClean="0"/>
-              <a:t>Service</a:t>
+              <a:t>Routing Service</a:t>
             </a:r>
             <a:endParaRPr lang="en-US" dirty="0"/>
           </a:p>
@@ -10075,6 +10207,36 @@
           </a:fontRef>
         </p:style>
       </p:cxnSp>
+      <p:pic>
+        <p:nvPicPr>
+          <p:cNvPr id="21" name="Picture 20"/>
+          <p:cNvPicPr>
+            <a:picLocks noChangeAspect="1"/>
+          </p:cNvPicPr>
+          <p:nvPr/>
+        </p:nvPicPr>
+        <p:blipFill>
+          <a:blip r:embed="rId2" cstate="print">
+            <a:extLst>
+              <a:ext uri="{28A0092B-C50C-407E-A947-70E740481C1C}">
+                <a14:useLocalDpi xmlns:a14="http://schemas.microsoft.com/office/drawing/2010/main" val="0"/>
+              </a:ext>
+            </a:extLst>
+          </a:blip>
+          <a:stretch>
+            <a:fillRect/>
+          </a:stretch>
+        </p:blipFill>
+        <p:spPr>
+          <a:xfrm>
+            <a:off x="9135291" y="292047"/>
+            <a:ext cx="2455817" cy="1381224"/>
+          </a:xfrm>
+          <a:prstGeom prst="rect">
+            <a:avLst/>
+          </a:prstGeom>
+        </p:spPr>
+      </p:pic>
     </p:spTree>
     <p:extLst>
       <p:ext uri="{BB962C8B-B14F-4D97-AF65-F5344CB8AC3E}">

</xml_diff>

<commit_message>
Added link to EDA article for prep work.
</commit_message>
<xml_diff>
--- a/EventDrivenArchitectureWorkshop.pptx
+++ b/EventDrivenArchitectureWorkshop.pptx
@@ -6598,7 +6598,7 @@
         <p:spPr/>
         <p:txBody>
           <a:bodyPr>
-            <a:normAutofit fontScale="77500" lnSpcReduction="20000"/>
+            <a:normAutofit fontScale="70000" lnSpcReduction="20000"/>
           </a:bodyPr>
           <a:lstStyle/>
           <a:p>
@@ -6663,9 +6663,34 @@
           <a:p>
             <a:r>
               <a:rPr lang="en-US" sz="3200" dirty="0" smtClean="0"/>
-              <a:t>Introduction to event-driven architecture article !!!</a:t>
-            </a:r>
-            <a:endParaRPr lang="en-US" sz="3200" dirty="0"/>
+              <a:t>Introduction to event-driven architecture </a:t>
+            </a:r>
+            <a:r>
+              <a:rPr lang="en-US" sz="3200" dirty="0" smtClean="0"/>
+              <a:t>article</a:t>
+            </a:r>
+          </a:p>
+          <a:p>
+            <a:pPr lvl="1"/>
+            <a:r>
+              <a:rPr lang="en-US" sz="2800">
+                <a:hlinkClick r:id="rId4"/>
+              </a:rPr>
+              <a:t>https://</a:t>
+            </a:r>
+            <a:r>
+              <a:rPr lang="en-US" sz="2800">
+                <a:hlinkClick r:id="rId4"/>
+              </a:rPr>
+              <a:t>developer.ibm.com/articles/advantages-of-an-event-driven-architecture</a:t>
+            </a:r>
+            <a:r>
+              <a:rPr lang="en-US" sz="2800" smtClean="0">
+                <a:hlinkClick r:id="rId4"/>
+              </a:rPr>
+              <a:t>/</a:t>
+            </a:r>
+            <a:endParaRPr lang="en-US" sz="2800" smtClean="0"/>
           </a:p>
         </p:txBody>
       </p:sp>

</xml_diff>